<commit_message>
added points in slide
</commit_message>
<xml_diff>
--- a/deliverables/part2/Team Presentation v2.0.pptx
+++ b/deliverables/part2/Team Presentation v2.0.pptx
@@ -301,7 +301,7 @@
             <a:fld id="{4FDDF971-5BBD-4275-816A-A21C98AA0947}" type="datetime1">
               <a:rPr lang="en-GB"/>
               <a:pPr lvl="0"/>
-              <a:t>13/04/2018</a:t>
+              <a:t>15/04/2018</a:t>
             </a:fld>
             <a:endParaRPr lang="en-GB"/>
           </a:p>
@@ -1726,7 +1726,7 @@
             <a:fld id="{43797CEA-D40C-4FC6-94FB-E8BC837C9EEA}" type="datetime1">
               <a:rPr lang="en-US" smtClean="0"/>
               <a:pPr lvl="0"/>
-              <a:t>4/13/2018</a:t>
+              <a:t>4/15/2018</a:t>
             </a:fld>
             <a:endParaRPr lang="en-US"/>
           </a:p>
@@ -2061,7 +2061,7 @@
             <a:fld id="{36F41398-F47A-4BD3-8B8C-2B8E0352936C}" type="datetime1">
               <a:rPr lang="en-US" smtClean="0"/>
               <a:pPr lvl="0"/>
-              <a:t>4/13/2018</a:t>
+              <a:t>4/15/2018</a:t>
             </a:fld>
             <a:endParaRPr lang="en-US"/>
           </a:p>
@@ -2245,7 +2245,7 @@
             <a:fld id="{748CA284-0556-4296-BC66-FF3E59AB9E6A}" type="datetime1">
               <a:rPr lang="en-US" smtClean="0"/>
               <a:pPr lvl="0"/>
-              <a:t>4/13/2018</a:t>
+              <a:t>4/15/2018</a:t>
             </a:fld>
             <a:endParaRPr lang="en-US"/>
           </a:p>
@@ -2419,7 +2419,7 @@
             <a:fld id="{1E6AC300-C1C3-49D9-9F70-E9B3985BE352}" type="datetime1">
               <a:rPr lang="en-US" smtClean="0"/>
               <a:pPr lvl="0"/>
-              <a:t>4/13/2018</a:t>
+              <a:t>4/15/2018</a:t>
             </a:fld>
             <a:endParaRPr lang="en-US"/>
           </a:p>
@@ -2701,7 +2701,7 @@
             <a:fld id="{BA2018BA-79BB-416F-84DD-EF143950D9C0}" type="datetime1">
               <a:rPr lang="en-US" smtClean="0"/>
               <a:pPr lvl="0"/>
-              <a:t>4/13/2018</a:t>
+              <a:t>4/15/2018</a:t>
             </a:fld>
             <a:endParaRPr lang="en-US"/>
           </a:p>
@@ -3099,7 +3099,7 @@
             <a:fld id="{00B30053-E1CF-41C0-8556-B2E3B467E19B}" type="datetime1">
               <a:rPr lang="en-US" smtClean="0"/>
               <a:pPr lvl="0"/>
-              <a:t>4/13/2018</a:t>
+              <a:t>4/15/2018</a:t>
             </a:fld>
             <a:endParaRPr lang="en-US"/>
           </a:p>
@@ -3580,7 +3580,7 @@
             <a:fld id="{DA52C346-5E77-4B96-A0D2-313480FC010D}" type="datetime1">
               <a:rPr lang="en-US" smtClean="0"/>
               <a:pPr lvl="0"/>
-              <a:t>4/13/2018</a:t>
+              <a:t>4/15/2018</a:t>
             </a:fld>
             <a:endParaRPr lang="en-US"/>
           </a:p>
@@ -3702,7 +3702,7 @@
             <a:fld id="{02ED8BEC-1500-42AD-9797-5BA07E1EC9EA}" type="datetime1">
               <a:rPr lang="en-US" smtClean="0"/>
               <a:pPr lvl="0"/>
-              <a:t>4/13/2018</a:t>
+              <a:t>4/15/2018</a:t>
             </a:fld>
             <a:endParaRPr lang="en-US"/>
           </a:p>
@@ -3802,7 +3802,7 @@
             <a:fld id="{F3D69F56-EB6E-4A84-98BA-84ADA3F0052A}" type="datetime1">
               <a:rPr lang="en-US" smtClean="0"/>
               <a:pPr lvl="0"/>
-              <a:t>4/13/2018</a:t>
+              <a:t>4/15/2018</a:t>
             </a:fld>
             <a:endParaRPr lang="en-US"/>
           </a:p>
@@ -4152,7 +4152,7 @@
             <a:fld id="{010A1D3B-AE8F-44AD-8E19-04392B48C56C}" type="datetime1">
               <a:rPr lang="en-US" smtClean="0"/>
               <a:pPr lvl="0"/>
-              <a:t>4/13/2018</a:t>
+              <a:t>4/15/2018</a:t>
             </a:fld>
             <a:endParaRPr lang="en-US"/>
           </a:p>
@@ -4544,7 +4544,7 @@
             <a:fld id="{65D88D30-1315-437C-B688-6984271D258D}" type="datetime1">
               <a:rPr lang="en-US" smtClean="0"/>
               <a:pPr lvl="0"/>
-              <a:t>4/13/2018</a:t>
+              <a:t>4/15/2018</a:t>
             </a:fld>
             <a:endParaRPr lang="en-US"/>
           </a:p>
@@ -4826,7 +4826,7 @@
             <a:fld id="{1179ACC6-564D-4259-BF5E-4FB05AACB601}" type="datetime1">
               <a:rPr lang="en-US" smtClean="0"/>
               <a:pPr lvl="0"/>
-              <a:t>4/13/2018</a:t>
+              <a:t>4/15/2018</a:t>
             </a:fld>
             <a:endParaRPr lang="en-US"/>
           </a:p>
@@ -6566,7 +6566,7 @@
           <a:bodyPr/>
           <a:lstStyle/>
           <a:p>
-            <a:endParaRPr lang="en-GB"/>
+            <a:endParaRPr lang="en-GB" dirty="0"/>
           </a:p>
         </p:txBody>
       </p:sp>
@@ -6794,13 +6794,13 @@
         </p:nvSpPr>
         <p:spPr>
           <a:xfrm>
-            <a:off x="1712875" y="1893402"/>
-            <a:ext cx="6556476" cy="3071195"/>
+            <a:off x="1712874" y="1893402"/>
+            <a:ext cx="8524429" cy="3712268"/>
           </a:xfrm>
         </p:spPr>
         <p:txBody>
           <a:bodyPr>
-            <a:normAutofit/>
+            <a:normAutofit lnSpcReduction="10000"/>
           </a:bodyPr>
           <a:lstStyle/>
           <a:p>
@@ -6843,6 +6843,17 @@
             <a:r>
               <a:rPr lang="en-GB" dirty="0"/>
               <a:t>Edgar – Programmer/Systems Analyst</a:t>
+            </a:r>
+          </a:p>
+          <a:p>
+            <a:pPr lvl="0"/>
+            <a:endParaRPr lang="en-GB" dirty="0"/>
+          </a:p>
+          <a:p>
+            <a:pPr lvl="0"/>
+            <a:r>
+              <a:rPr lang="en-GB" dirty="0"/>
+              <a:t>Although these were the roles that we took on, we helped each other where we could to increase productivity</a:t>
             </a:r>
           </a:p>
           <a:p>
@@ -6969,38 +6980,38 @@
           <a:p>
             <a:pPr lvl="0"/>
             <a:r>
-              <a:rPr lang="en-GB"/>
+              <a:rPr lang="en-GB" dirty="0"/>
               <a:t>Started off with organising who wants to do which part of the 1</a:t>
             </a:r>
             <a:r>
-              <a:rPr lang="en-GB" baseline="30000"/>
+              <a:rPr lang="en-GB" baseline="30000" dirty="0"/>
               <a:t>st</a:t>
             </a:r>
             <a:r>
-              <a:rPr lang="en-GB"/>
+              <a:rPr lang="en-GB" dirty="0"/>
               <a:t> deliverable.</a:t>
             </a:r>
           </a:p>
           <a:p>
             <a:pPr lvl="0"/>
-            <a:endParaRPr lang="en-GB"/>
-          </a:p>
-          <a:p>
-            <a:pPr lvl="0"/>
-            <a:r>
-              <a:rPr lang="en-GB"/>
+            <a:endParaRPr lang="en-GB" dirty="0"/>
+          </a:p>
+          <a:p>
+            <a:pPr lvl="0"/>
+            <a:r>
+              <a:rPr lang="en-GB" dirty="0"/>
               <a:t>We set up to meet twice a week, one on the day of our consultant meeting (Thursday) and usually a Monday when we were all at university.</a:t>
             </a:r>
           </a:p>
           <a:p>
             <a:pPr lvl="0"/>
-            <a:endParaRPr lang="en-GB"/>
-          </a:p>
-          <a:p>
-            <a:pPr lvl="0"/>
-            <a:r>
-              <a:rPr lang="en-GB"/>
-              <a:t>We divided up tasks for that week and set deadlines to ensure we were on top of tasks that were needed to be completed. We were able to check up on progress through GitHub and also through social media such as WhatsApp.</a:t>
+            <a:endParaRPr lang="en-GB" dirty="0"/>
+          </a:p>
+          <a:p>
+            <a:pPr lvl="0"/>
+            <a:r>
+              <a:rPr lang="en-GB" dirty="0"/>
+              <a:t>We divided up tasks for that week and set deadlines to ensure we were on top of tasks that were needed to be completed. We were able to check up on progress through GitHub and also through social media such as WhatsApp. </a:t>
             </a:r>
           </a:p>
         </p:txBody>

</xml_diff>